<commit_message>
Integración de las demos de los componentes de PIICO
Ya estan el el Servidor, Pagina oficial de PIICO
</commit_message>
<xml_diff>
--- a/Documentos/Arq HA.pptx
+++ b/Documentos/Arq HA.pptx
@@ -201,7 +201,7 @@
           <a:p>
             <a:fld id="{0EE65A21-46AB-477C-9119-D8BD67F16109}" type="datetimeFigureOut">
               <a:rPr lang="es-CO" smtClean="0"/>
-              <a:t>12/09/2019</a:t>
+              <a:t>28/11/2019</a:t>
             </a:fld>
             <a:endParaRPr lang="es-CO"/>
           </a:p>
@@ -618,7 +618,7 @@
           <a:p>
             <a:fld id="{A0DB04D4-EB82-4B3C-888F-C1C03CC4F525}" type="datetimeFigureOut">
               <a:rPr lang="es-CO" smtClean="0"/>
-              <a:t>12/09/2019</a:t>
+              <a:t>28/11/2019</a:t>
             </a:fld>
             <a:endParaRPr lang="es-CO"/>
           </a:p>
@@ -818,7 +818,7 @@
           <a:p>
             <a:fld id="{A0DB04D4-EB82-4B3C-888F-C1C03CC4F525}" type="datetimeFigureOut">
               <a:rPr lang="es-CO" smtClean="0"/>
-              <a:t>12/09/2019</a:t>
+              <a:t>28/11/2019</a:t>
             </a:fld>
             <a:endParaRPr lang="es-CO"/>
           </a:p>
@@ -1028,7 +1028,7 @@
           <a:p>
             <a:fld id="{A0DB04D4-EB82-4B3C-888F-C1C03CC4F525}" type="datetimeFigureOut">
               <a:rPr lang="es-CO" smtClean="0"/>
-              <a:t>12/09/2019</a:t>
+              <a:t>28/11/2019</a:t>
             </a:fld>
             <a:endParaRPr lang="es-CO"/>
           </a:p>
@@ -1228,7 +1228,7 @@
           <a:p>
             <a:fld id="{A0DB04D4-EB82-4B3C-888F-C1C03CC4F525}" type="datetimeFigureOut">
               <a:rPr lang="es-CO" smtClean="0"/>
-              <a:t>12/09/2019</a:t>
+              <a:t>28/11/2019</a:t>
             </a:fld>
             <a:endParaRPr lang="es-CO"/>
           </a:p>
@@ -1504,7 +1504,7 @@
           <a:p>
             <a:fld id="{A0DB04D4-EB82-4B3C-888F-C1C03CC4F525}" type="datetimeFigureOut">
               <a:rPr lang="es-CO" smtClean="0"/>
-              <a:t>12/09/2019</a:t>
+              <a:t>28/11/2019</a:t>
             </a:fld>
             <a:endParaRPr lang="es-CO"/>
           </a:p>
@@ -1772,7 +1772,7 @@
           <a:p>
             <a:fld id="{A0DB04D4-EB82-4B3C-888F-C1C03CC4F525}" type="datetimeFigureOut">
               <a:rPr lang="es-CO" smtClean="0"/>
-              <a:t>12/09/2019</a:t>
+              <a:t>28/11/2019</a:t>
             </a:fld>
             <a:endParaRPr lang="es-CO"/>
           </a:p>
@@ -2187,7 +2187,7 @@
           <a:p>
             <a:fld id="{A0DB04D4-EB82-4B3C-888F-C1C03CC4F525}" type="datetimeFigureOut">
               <a:rPr lang="es-CO" smtClean="0"/>
-              <a:t>12/09/2019</a:t>
+              <a:t>28/11/2019</a:t>
             </a:fld>
             <a:endParaRPr lang="es-CO"/>
           </a:p>
@@ -2329,7 +2329,7 @@
           <a:p>
             <a:fld id="{A0DB04D4-EB82-4B3C-888F-C1C03CC4F525}" type="datetimeFigureOut">
               <a:rPr lang="es-CO" smtClean="0"/>
-              <a:t>12/09/2019</a:t>
+              <a:t>28/11/2019</a:t>
             </a:fld>
             <a:endParaRPr lang="es-CO"/>
           </a:p>
@@ -2442,7 +2442,7 @@
           <a:p>
             <a:fld id="{A0DB04D4-EB82-4B3C-888F-C1C03CC4F525}" type="datetimeFigureOut">
               <a:rPr lang="es-CO" smtClean="0"/>
-              <a:t>12/09/2019</a:t>
+              <a:t>28/11/2019</a:t>
             </a:fld>
             <a:endParaRPr lang="es-CO"/>
           </a:p>
@@ -2755,7 +2755,7 @@
           <a:p>
             <a:fld id="{A0DB04D4-EB82-4B3C-888F-C1C03CC4F525}" type="datetimeFigureOut">
               <a:rPr lang="es-CO" smtClean="0"/>
-              <a:t>12/09/2019</a:t>
+              <a:t>28/11/2019</a:t>
             </a:fld>
             <a:endParaRPr lang="es-CO"/>
           </a:p>
@@ -3044,7 +3044,7 @@
           <a:p>
             <a:fld id="{A0DB04D4-EB82-4B3C-888F-C1C03CC4F525}" type="datetimeFigureOut">
               <a:rPr lang="es-CO" smtClean="0"/>
-              <a:t>12/09/2019</a:t>
+              <a:t>28/11/2019</a:t>
             </a:fld>
             <a:endParaRPr lang="es-CO"/>
           </a:p>
@@ -3287,7 +3287,7 @@
           <a:p>
             <a:fld id="{A0DB04D4-EB82-4B3C-888F-C1C03CC4F525}" type="datetimeFigureOut">
               <a:rPr lang="es-CO" smtClean="0"/>
-              <a:t>12/09/2019</a:t>
+              <a:t>28/11/2019</a:t>
             </a:fld>
             <a:endParaRPr lang="es-CO"/>
           </a:p>
@@ -4980,8 +4980,8 @@
         </p:nvCxnSpPr>
         <p:spPr>
           <a:xfrm flipH="1">
-            <a:off x="4545874" y="4201068"/>
-            <a:ext cx="1224573" cy="1175472"/>
+            <a:off x="4545874" y="4201532"/>
+            <a:ext cx="1224572" cy="1175008"/>
           </a:xfrm>
           <a:prstGeom prst="line">
             <a:avLst/>
@@ -5023,8 +5023,8 @@
         </p:nvCxnSpPr>
         <p:spPr>
           <a:xfrm>
-            <a:off x="5770447" y="4201068"/>
-            <a:ext cx="1224573" cy="1175472"/>
+            <a:off x="5770446" y="4201532"/>
+            <a:ext cx="1224574" cy="1175008"/>
           </a:xfrm>
           <a:prstGeom prst="line">
             <a:avLst/>
@@ -5268,7 +5268,7 @@
         </p:nvGrpSpPr>
         <p:grpSpPr>
           <a:xfrm>
-            <a:off x="4088673" y="2616870"/>
+            <a:off x="4088672" y="2617334"/>
             <a:ext cx="3363547" cy="1584198"/>
             <a:chOff x="4088673" y="2499303"/>
             <a:chExt cx="3363547" cy="1584198"/>
@@ -5506,9 +5506,9 @@
           <p:nvPr/>
         </p:nvCxnSpPr>
         <p:spPr>
-          <a:xfrm>
-            <a:off x="5770446" y="1509194"/>
-            <a:ext cx="0" cy="1107676"/>
+          <a:xfrm flipH="1">
+            <a:off x="5770445" y="1509194"/>
+            <a:ext cx="1" cy="1108140"/>
           </a:xfrm>
           <a:prstGeom prst="line">
             <a:avLst/>
@@ -6417,8 +6417,8 @@
         </p:blipFill>
         <p:spPr>
           <a:xfrm>
-            <a:off x="1924299" y="0"/>
-            <a:ext cx="8343401" cy="6858000"/>
+            <a:off x="2455101" y="147871"/>
+            <a:ext cx="7599656" cy="6246666"/>
           </a:xfrm>
           <a:prstGeom prst="rect">
             <a:avLst/>

</xml_diff>